<commit_message>
WIP Doku and stuff
</commit_message>
<xml_diff>
--- a/doc_source/poster/Poster.pptx
+++ b/doc_source/poster/Poster.pptx
@@ -1063,39 +1063,7 @@
                 </a:solidFill>
                 <a:latin typeface="Lucida Sans" pitchFamily="34" charset="0"/>
               </a:rPr>
-              <a:t>Beim Billard muss sich der Spieler mögliche Stösse überlegen und die Stärke und den Winkel, mit dem die weisse Kugel angestossen werden soll, abschätzen. Was nach dem Stoss passiert, muss sich der Spieler aufgrund seiner Erfahrung im Spiel vorstellen.</a:t>
-            </a:r>
-          </a:p>
-        </p:txBody>
-      </p:sp>
-      <p:sp>
-        <p:nvSpPr>
-          <p:cNvPr id="2" name="Textfeld 1" descr="Bitte möglichst die vorgegebene Breite einhalten! Sollte dieser Platz nicht reichen, kann im oberen Teil ein zusätzlicher längerer Titel verwendet werden." title="Titelfeld"/>
-          <p:cNvSpPr txBox="1"/>
-          <p:nvPr/>
-        </p:nvSpPr>
-        <p:spPr>
-          <a:xfrm>
-            <a:off x="6969455" y="18414124"/>
-            <a:ext cx="15122378" cy="1323439"/>
-          </a:xfrm>
-          <a:prstGeom prst="rect">
-            <a:avLst/>
-          </a:prstGeom>
-          <a:noFill/>
-        </p:spPr>
-        <p:txBody>
-          <a:bodyPr wrap="none" lIns="72000" tIns="72000" rIns="72000" bIns="72000" rtlCol="0">
-            <a:normAutofit/>
-          </a:bodyPr>
-          <a:lstStyle/>
-          <a:p>
-            <a:pPr algn="ctr"/>
-            <a:r>
-              <a:rPr lang="de-CH" sz="7200" dirty="0">
-                <a:latin typeface="HelveticaNeue LT 45 Light" pitchFamily="34" charset="0"/>
-              </a:rPr>
-              <a:t>Billiard-AI</a:t>
+              <a:t>Beim Billard muss sich der Spieler mögliche Stösse überlegen und die Kraft sowie den Winkel, mit dem die weisse Kugel an-gestossen werden soll, abschätzen. Was nach dem Stoss passiert, muss sich der Spieler aufgrund seiner Erfahrung im Spiel vorstellen.</a:t>
             </a:r>
           </a:p>
         </p:txBody>
@@ -1647,55 +1615,6 @@
       </p:graphicFrame>
       <p:sp>
         <p:nvSpPr>
-          <p:cNvPr id="3" name="Textfeld 2"/>
-          <p:cNvSpPr txBox="1"/>
-          <p:nvPr/>
-        </p:nvSpPr>
-        <p:spPr>
-          <a:xfrm>
-            <a:off x="7329511" y="20030399"/>
-            <a:ext cx="14402265" cy="584775"/>
-          </a:xfrm>
-          <a:prstGeom prst="rect">
-            <a:avLst/>
-          </a:prstGeom>
-          <a:noFill/>
-        </p:spPr>
-        <p:txBody>
-          <a:bodyPr wrap="square" rtlCol="0">
-            <a:spAutoFit/>
-          </a:bodyPr>
-          <a:lstStyle/>
-          <a:p>
-            <a:pPr marL="266700" indent="-266700" algn="ctr">
-              <a:buClr>
-                <a:srgbClr val="FAA500"/>
-              </a:buClr>
-              <a:buSzPct val="80000"/>
-              <a:buFont typeface="Lucida Grande" charset="0"/>
-              <a:buChar char="▶"/>
-              <a:defRPr/>
-            </a:pPr>
-            <a:r>
-              <a:rPr lang="de-CH" altLang="de-DE" sz="3200" dirty="0">
-                <a:solidFill>
-                  <a:srgbClr val="697D91"/>
-                </a:solidFill>
-                <a:latin typeface="Lucida Sans" pitchFamily="34" charset="0"/>
-              </a:rPr>
-              <a:t>Bachelor Thesis 2021/22		Studiengang Informatik</a:t>
-            </a:r>
-            <a:endParaRPr lang="de-CH" sz="3200" dirty="0">
-              <a:solidFill>
-                <a:srgbClr val="697D91"/>
-              </a:solidFill>
-              <a:latin typeface="Lucida Sans" pitchFamily="34" charset="0"/>
-            </a:endParaRPr>
-          </a:p>
-        </p:txBody>
-      </p:sp>
-      <p:sp>
-        <p:nvSpPr>
           <p:cNvPr id="10" name="Textfeld 9"/>
           <p:cNvSpPr txBox="1"/>
           <p:nvPr/>
@@ -1728,22 +1647,6 @@
                 </a:solidFill>
                 <a:latin typeface="Lucida Sans" pitchFamily="34" charset="0"/>
               </a:rPr>
-              <a:t>Die Simulation wurde mit real durchgeführten Stössen verglichen und es wurden minimale Abweichungen festgestellt. </a:t>
-            </a:r>
-          </a:p>
-          <a:p>
-            <a:pPr algn="just">
-              <a:spcAft>
-                <a:spcPts val="600"/>
-              </a:spcAft>
-            </a:pPr>
-            <a:r>
-              <a:rPr lang="de-CH" altLang="de-DE" sz="3200" dirty="0">
-                <a:solidFill>
-                  <a:schemeClr val="tx1"/>
-                </a:solidFill>
-                <a:latin typeface="Lucida Sans" pitchFamily="34" charset="0"/>
-              </a:rPr>
               <a:t>Ein Spiel wird mithilfe der Simulation über mehrere Züge geplant und dem Spieler wird eine Abfolge von Stössen präsentiert.</a:t>
             </a:r>
           </a:p>
@@ -1761,6 +1664,22 @@
                 <a:latin typeface="Lucida Sans" pitchFamily="34" charset="0"/>
               </a:rPr>
               <a:t>Er kann dank dieser Unterstützung sein strategisches Denken und die korrekte Ausführung üben.</a:t>
+            </a:r>
+          </a:p>
+          <a:p>
+            <a:pPr algn="just">
+              <a:spcAft>
+                <a:spcPts val="600"/>
+              </a:spcAft>
+            </a:pPr>
+            <a:r>
+              <a:rPr lang="de-CH" altLang="de-DE" sz="3200" dirty="0">
+                <a:solidFill>
+                  <a:schemeClr val="tx1"/>
+                </a:solidFill>
+                <a:latin typeface="Lucida Sans" pitchFamily="34" charset="0"/>
+              </a:rPr>
+              <a:t>Die Simulation wurde mit real durch-geführten Stössen verglichen und es wurden minimale Abweichungen festgestellt. </a:t>
             </a:r>
           </a:p>
           <a:p>
@@ -1868,7 +1787,7 @@
                 </a:solidFill>
                 <a:latin typeface="Lucida Sans" pitchFamily="34" charset="0"/>
               </a:rPr>
-              <a:t>Entstanden ist ein intelligenter Billardtisch, der dem Anwender spielerisch beibringt, wie wenig Stärke ein gutes Billardspiel braucht, seinen Blick für optimale Züge schärft und deren erfolgreiche Ausführung trainiert.</a:t>
+              <a:t>Entstanden ist ein intelligenter Billardtisch, der dem Anwender spielerisch beibringt, wie wenig Kraft ein gutes Billardspiel braucht, seinen Blick für optimale Züge schärft und deren erfolgreiche Ausführung trainiert.</a:t>
             </a:r>
           </a:p>
           <a:p>
@@ -1898,7 +1817,7 @@
         <p:spPr>
           <a:xfrm>
             <a:off x="10625842" y="875400"/>
-            <a:ext cx="8845847" cy="16573768"/>
+            <a:ext cx="8845847" cy="17066210"/>
           </a:xfrm>
           <a:prstGeom prst="rect">
             <a:avLst/>
@@ -1927,7 +1846,7 @@
             </a:r>
           </a:p>
           <a:p>
-            <a:pPr>
+            <a:pPr algn="just">
               <a:spcAft>
                 <a:spcPts val="600"/>
               </a:spcAft>
@@ -1943,7 +1862,7 @@
             </a:r>
           </a:p>
           <a:p>
-            <a:pPr>
+            <a:pPr algn="just">
               <a:spcAft>
                 <a:spcPts val="600"/>
               </a:spcAft>
@@ -1956,7 +1875,7 @@
             </a:endParaRPr>
           </a:p>
           <a:p>
-            <a:pPr>
+            <a:pPr algn="just">
               <a:spcAft>
                 <a:spcPts val="600"/>
               </a:spcAft>
@@ -1972,7 +1891,7 @@
             </a:r>
           </a:p>
           <a:p>
-            <a:pPr>
+            <a:pPr algn="just">
               <a:spcAft>
                 <a:spcPts val="600"/>
               </a:spcAft>
@@ -1984,7 +1903,7 @@
                 </a:solidFill>
                 <a:latin typeface="Lucida Sans" pitchFamily="34" charset="0"/>
               </a:rPr>
-              <a:t>Sowohl direkte wie auch Stösse über die Banden werden berücksichtigt und die benötigte Geschwindigkeit wird berechnet. Vorgeschlagen werden die Einfachsten und Erfolgversprechendsten.</a:t>
+              <a:t>Sowohl direkte wie auch Stösse über die Banden werden berücksichtigt und die benötigte Geschwindigkeit des Spielballs wird berechnet. Vorgeschlagen werden die Einfachsten und Erfolgversprechendsten.</a:t>
             </a:r>
           </a:p>
           <a:p>
@@ -2013,15 +1932,17 @@
                 </a:solidFill>
                 <a:latin typeface="Lucida Sans" pitchFamily="34" charset="0"/>
               </a:rPr>
-              <a:t>Eine Physiksimulation berechnet die Spielsituation nach dem Stoss. Der Weg jeder beteiligten Kugel wird anhand von Linien auf dem Tisch angezeigt und durch die Animation projizierter Kugeln wird der Ablauf visualisiert. Dadurch ist ersichtlich, wo welche Kugeln zusammentreffen, eingelocht werden oder zum Stillstand kommen. </a:t>
+              <a:t>Eine Physiksimulation berechnet die Spiel-situation nach dem Stoss. Der Weg jeder beteiligten Kugel wird anhand von Linien auf dem Tisch angezeigt und durch die Animation projizierter Kugeln wird der Ablauf visualisiert. Dadurch wird </a:t>
             </a:r>
-          </a:p>
-          <a:p>
-            <a:pPr algn="just">
-              <a:spcAft>
-                <a:spcPts val="600"/>
-              </a:spcAft>
-            </a:pPr>
+            <a:r>
+              <a:rPr lang="de-CH" altLang="de-DE" sz="3200" dirty="0" err="1">
+                <a:solidFill>
+                  <a:schemeClr val="tx1"/>
+                </a:solidFill>
+                <a:latin typeface="Lucida Sans" pitchFamily="34" charset="0"/>
+              </a:rPr>
+              <a:t>ersicht-lich</a:t>
+            </a:r>
             <a:r>
               <a:rPr lang="de-CH" altLang="de-DE" sz="3200" dirty="0">
                 <a:solidFill>
@@ -2029,7 +1950,23 @@
                 </a:solidFill>
                 <a:latin typeface="Lucida Sans" pitchFamily="34" charset="0"/>
               </a:rPr>
-              <a:t>Der Spieler kann den Billardqueue an den angezeigten Linien ausrichten und die animierte Geschwindigkeit nachvollziehen, damit der Stoss gelingt.</a:t>
+              <a:t>, wo welche Kugeln zusammentreffen, eingelocht werden oder zum Stillstand kommen. </a:t>
+            </a:r>
+          </a:p>
+          <a:p>
+            <a:pPr algn="just">
+              <a:spcAft>
+                <a:spcPts val="600"/>
+              </a:spcAft>
+            </a:pPr>
+            <a:r>
+              <a:rPr lang="de-CH" altLang="de-DE" sz="3200" dirty="0">
+                <a:solidFill>
+                  <a:schemeClr val="tx1"/>
+                </a:solidFill>
+                <a:latin typeface="Lucida Sans" pitchFamily="34" charset="0"/>
+              </a:rPr>
+              <a:t>Der Spieler kann den Billardqueue (Stock) an den angezeigten Linien ausrichten und die animierte Geschwindigkeit nach-vollziehen, damit der Stoss gelingt.</a:t>
             </a:r>
           </a:p>
         </p:txBody>
@@ -2139,6 +2076,99 @@
           </p:txBody>
         </p:sp>
       </p:grpSp>
+      <p:sp>
+        <p:nvSpPr>
+          <p:cNvPr id="14" name="Textfeld 13">
+            <a:extLst>
+              <a:ext uri="{FF2B5EF4-FFF2-40B4-BE49-F238E27FC236}">
+                <a16:creationId xmlns:a16="http://schemas.microsoft.com/office/drawing/2014/main" id="{47549BCB-F44B-4555-A019-5463B9C28F6C}"/>
+              </a:ext>
+            </a:extLst>
+          </p:cNvPr>
+          <p:cNvSpPr txBox="1"/>
+          <p:nvPr/>
+        </p:nvSpPr>
+        <p:spPr>
+          <a:xfrm>
+            <a:off x="6969455" y="20026302"/>
+            <a:ext cx="15122377" cy="584775"/>
+          </a:xfrm>
+          <a:prstGeom prst="rect">
+            <a:avLst/>
+          </a:prstGeom>
+          <a:noFill/>
+        </p:spPr>
+        <p:txBody>
+          <a:bodyPr wrap="square" rtlCol="0">
+            <a:spAutoFit/>
+          </a:bodyPr>
+          <a:lstStyle/>
+          <a:p>
+            <a:pPr marL="266700" indent="-266700" algn="ctr">
+              <a:buClr>
+                <a:srgbClr val="FAA500"/>
+              </a:buClr>
+              <a:buSzPct val="80000"/>
+              <a:buFont typeface="Lucida Grande" charset="0"/>
+              <a:buChar char="▶"/>
+              <a:defRPr/>
+            </a:pPr>
+            <a:r>
+              <a:rPr lang="de-CH" altLang="de-DE" sz="3200" dirty="0">
+                <a:solidFill>
+                  <a:srgbClr val="697D91"/>
+                </a:solidFill>
+                <a:latin typeface="Lucida Sans" pitchFamily="34" charset="0"/>
+              </a:rPr>
+              <a:t> Bachelor Thesis 2022	Studiengang Informatik</a:t>
+            </a:r>
+            <a:endParaRPr lang="de-CH" sz="3200" dirty="0">
+              <a:solidFill>
+                <a:srgbClr val="697D91"/>
+              </a:solidFill>
+              <a:latin typeface="Lucida Sans" pitchFamily="34" charset="0"/>
+            </a:endParaRPr>
+          </a:p>
+        </p:txBody>
+      </p:sp>
+      <p:sp>
+        <p:nvSpPr>
+          <p:cNvPr id="16" name="Textfeld 15" descr="Bitte möglichst die vorgegebene Breite einhalten! Sollte dieser Platz nicht reichen, kann im oberen Teil ein zusätzlicher längerer Titel verwendet werden." title="Titelfeld">
+            <a:extLst>
+              <a:ext uri="{FF2B5EF4-FFF2-40B4-BE49-F238E27FC236}">
+                <a16:creationId xmlns:a16="http://schemas.microsoft.com/office/drawing/2014/main" id="{8EF62355-3BE4-43FC-A9EC-B82DA8154700}"/>
+              </a:ext>
+            </a:extLst>
+          </p:cNvPr>
+          <p:cNvSpPr txBox="1"/>
+          <p:nvPr/>
+        </p:nvSpPr>
+        <p:spPr>
+          <a:xfrm>
+            <a:off x="6969455" y="18414124"/>
+            <a:ext cx="15122378" cy="1323439"/>
+          </a:xfrm>
+          <a:prstGeom prst="rect">
+            <a:avLst/>
+          </a:prstGeom>
+          <a:noFill/>
+        </p:spPr>
+        <p:txBody>
+          <a:bodyPr wrap="none" lIns="72000" tIns="72000" rIns="72000" bIns="72000" rtlCol="0">
+            <a:normAutofit lnSpcReduction="10000"/>
+          </a:bodyPr>
+          <a:lstStyle/>
+          <a:p>
+            <a:pPr algn="ctr"/>
+            <a:r>
+              <a:rPr lang="de-CH" sz="8000" dirty="0">
+                <a:latin typeface="+mj-lt"/>
+              </a:rPr>
+              <a:t>Billiard-AI</a:t>
+            </a:r>
+          </a:p>
+        </p:txBody>
+      </p:sp>
     </p:spTree>
     <p:extLst>
       <p:ext uri="{BB962C8B-B14F-4D97-AF65-F5344CB8AC3E}">
@@ -2413,37 +2443,6 @@
 </file>
 
 <file path=customXml/item1.xml><?xml version="1.0" encoding="utf-8"?>
-<LongProperties xmlns="http://schemas.microsoft.com/office/2006/metadata/longProperties"/>
-</file>
-
-<file path=customXml/item2.xml><?xml version="1.0" encoding="utf-8"?>
-<p:properties xmlns:p="http://schemas.microsoft.com/office/2006/metadata/properties" xmlns:xsi="http://www.w3.org/2001/XMLSchema-instance" xmlns:pc="http://schemas.microsoft.com/office/infopath/2007/PartnerControls">
-  <documentManagement>
-    <BfhIntranetDepartmentText xmlns="63c724b1-652e-424f-8d99-4ee509067280">
-      <Terms xmlns="http://schemas.microsoft.com/office/infopath/2007/PartnerControls">
-        <TermInfo xmlns="http://schemas.microsoft.com/office/infopath/2007/PartnerControls">
-          <TermName xmlns="http://schemas.microsoft.com/office/infopath/2007/PartnerControls">Vorlage</TermName>
-          <TermId xmlns="http://schemas.microsoft.com/office/infopath/2007/PartnerControls">de1a6d3c-ac6a-4b34-8edd-308eb81066db</TermId>
-        </TermInfo>
-      </Terms>
-    </BfhIntranetDepartmentText>
-    <TaxCatchAll xmlns="2551ef7e-3b29-44d1-a8ad-ef34c26bfc60">
-      <Value>241</Value>
-    </TaxCatchAll>
-  </documentManagement>
-</p:properties>
-</file>
-
-<file path=customXml/item3.xml><?xml version="1.0" encoding="utf-8"?>
-<?mso-contentType ?>
-<FormTemplates xmlns="http://schemas.microsoft.com/sharepoint/v3/contenttype/forms">
-  <Display>DocumentLibraryForm</Display>
-  <Edit>DocumentLibraryForm</Edit>
-  <New>DocumentLibraryForm</New>
-</FormTemplates>
-</file>
-
-<file path=customXml/item4.xml><?xml version="1.0" encoding="utf-8"?>
 <ct:contentTypeSchema xmlns:ct="http://schemas.microsoft.com/office/2006/metadata/contentType" xmlns:ma="http://schemas.microsoft.com/office/2006/metadata/properties/metaAttributes" ct:_="" ma:_="" ma:contentTypeName="BFH Document" ma:contentTypeID="0x0101009127C3B567804923A8661E062BBD8EF500562C9D82744B284A86093F1D9B579BDC" ma:contentTypeVersion="2" ma:contentTypeDescription="Ein neues Dokument erstellen." ma:contentTypeScope="" ma:versionID="9c45b5bf27c78835ceac1d8ed0ad849b">
   <xsd:schema xmlns:xsd="http://www.w3.org/2001/XMLSchema" xmlns:xs="http://www.w3.org/2001/XMLSchema" xmlns:p="http://schemas.microsoft.com/office/2006/metadata/properties" xmlns:ns2="63c724b1-652e-424f-8d99-4ee509067280" xmlns:ns3="2551ef7e-3b29-44d1-a8ad-ef34c26bfc60" targetNamespace="http://schemas.microsoft.com/office/2006/metadata/properties" ma:root="true" ma:fieldsID="77ddedd9f4909d73cfb737d3d691d0f9" ns2:_="" ns3:_="">
     <xsd:import namespace="63c724b1-652e-424f-8d99-4ee509067280"/>
@@ -2588,15 +2587,65 @@
 </ct:contentTypeSchema>
 </file>
 
+<file path=customXml/item2.xml><?xml version="1.0" encoding="utf-8"?>
+<?mso-contentType ?>
+<FormTemplates xmlns="http://schemas.microsoft.com/sharepoint/v3/contenttype/forms">
+  <Display>DocumentLibraryForm</Display>
+  <Edit>DocumentLibraryForm</Edit>
+  <New>DocumentLibraryForm</New>
+</FormTemplates>
+</file>
+
+<file path=customXml/item3.xml><?xml version="1.0" encoding="utf-8"?>
+<p:properties xmlns:p="http://schemas.microsoft.com/office/2006/metadata/properties" xmlns:xsi="http://www.w3.org/2001/XMLSchema-instance" xmlns:pc="http://schemas.microsoft.com/office/infopath/2007/PartnerControls">
+  <documentManagement>
+    <BfhIntranetDepartmentText xmlns="63c724b1-652e-424f-8d99-4ee509067280">
+      <Terms xmlns="http://schemas.microsoft.com/office/infopath/2007/PartnerControls">
+        <TermInfo xmlns="http://schemas.microsoft.com/office/infopath/2007/PartnerControls">
+          <TermName xmlns="http://schemas.microsoft.com/office/infopath/2007/PartnerControls">Vorlage</TermName>
+          <TermId xmlns="http://schemas.microsoft.com/office/infopath/2007/PartnerControls">de1a6d3c-ac6a-4b34-8edd-308eb81066db</TermId>
+        </TermInfo>
+      </Terms>
+    </BfhIntranetDepartmentText>
+    <TaxCatchAll xmlns="2551ef7e-3b29-44d1-a8ad-ef34c26bfc60">
+      <Value>241</Value>
+    </TaxCatchAll>
+  </documentManagement>
+</p:properties>
+</file>
+
+<file path=customXml/item4.xml><?xml version="1.0" encoding="utf-8"?>
+<LongProperties xmlns="http://schemas.microsoft.com/office/2006/metadata/longProperties"/>
+</file>
+
 <file path=customXml/itemProps1.xml><?xml version="1.0" encoding="utf-8"?>
-<ds:datastoreItem xmlns:ds="http://schemas.openxmlformats.org/officeDocument/2006/customXml" ds:itemID="{34ACECAE-8DDC-4218-ADDE-80828E100BF5}">
+<ds:datastoreItem xmlns:ds="http://schemas.openxmlformats.org/officeDocument/2006/customXml" ds:itemID="{064F56C1-3E03-4158-81FF-45AFD11405FB}">
   <ds:schemaRefs>
-    <ds:schemaRef ds:uri="http://schemas.microsoft.com/office/2006/metadata/longProperties"/>
+    <ds:schemaRef ds:uri="http://schemas.microsoft.com/office/2006/metadata/contentType"/>
+    <ds:schemaRef ds:uri="http://schemas.microsoft.com/office/2006/metadata/properties/metaAttributes"/>
+    <ds:schemaRef ds:uri="http://www.w3.org/2001/XMLSchema"/>
+    <ds:schemaRef ds:uri="http://schemas.microsoft.com/office/2006/metadata/properties"/>
+    <ds:schemaRef ds:uri="63c724b1-652e-424f-8d99-4ee509067280"/>
+    <ds:schemaRef ds:uri="2551ef7e-3b29-44d1-a8ad-ef34c26bfc60"/>
+    <ds:schemaRef ds:uri="http://schemas.microsoft.com/office/2006/documentManagement/types"/>
+    <ds:schemaRef ds:uri="http://schemas.microsoft.com/office/infopath/2007/PartnerControls"/>
+    <ds:schemaRef ds:uri="http://schemas.openxmlformats.org/package/2006/metadata/core-properties"/>
+    <ds:schemaRef ds:uri="http://purl.org/dc/elements/1.1/"/>
+    <ds:schemaRef ds:uri="http://purl.org/dc/terms/"/>
+    <ds:schemaRef ds:uri="http://schemas.microsoft.com/internal/obd"/>
   </ds:schemaRefs>
 </ds:datastoreItem>
 </file>
 
 <file path=customXml/itemProps2.xml><?xml version="1.0" encoding="utf-8"?>
+<ds:datastoreItem xmlns:ds="http://schemas.openxmlformats.org/officeDocument/2006/customXml" ds:itemID="{47870AFC-B140-4E73-B0E2-054A74E7EB25}">
+  <ds:schemaRefs>
+    <ds:schemaRef ds:uri="http://schemas.microsoft.com/sharepoint/v3/contenttype/forms"/>
+  </ds:schemaRefs>
+</ds:datastoreItem>
+</file>
+
+<file path=customXml/itemProps3.xml><?xml version="1.0" encoding="utf-8"?>
 <ds:datastoreItem xmlns:ds="http://schemas.openxmlformats.org/officeDocument/2006/customXml" ds:itemID="{12310AE4-98C2-4A3E-BE75-5A8AB8823A32}">
   <ds:schemaRefs>
     <ds:schemaRef ds:uri="2551ef7e-3b29-44d1-a8ad-ef34c26bfc60"/>
@@ -2613,29 +2662,10 @@
 </ds:datastoreItem>
 </file>
 
-<file path=customXml/itemProps3.xml><?xml version="1.0" encoding="utf-8"?>
-<ds:datastoreItem xmlns:ds="http://schemas.openxmlformats.org/officeDocument/2006/customXml" ds:itemID="{47870AFC-B140-4E73-B0E2-054A74E7EB25}">
+<file path=customXml/itemProps4.xml><?xml version="1.0" encoding="utf-8"?>
+<ds:datastoreItem xmlns:ds="http://schemas.openxmlformats.org/officeDocument/2006/customXml" ds:itemID="{34ACECAE-8DDC-4218-ADDE-80828E100BF5}">
   <ds:schemaRefs>
-    <ds:schemaRef ds:uri="http://schemas.microsoft.com/sharepoint/v3/contenttype/forms"/>
-  </ds:schemaRefs>
-</ds:datastoreItem>
-</file>
-
-<file path=customXml/itemProps4.xml><?xml version="1.0" encoding="utf-8"?>
-<ds:datastoreItem xmlns:ds="http://schemas.openxmlformats.org/officeDocument/2006/customXml" ds:itemID="{064F56C1-3E03-4158-81FF-45AFD11405FB}">
-  <ds:schemaRefs>
-    <ds:schemaRef ds:uri="http://schemas.microsoft.com/office/2006/metadata/contentType"/>
-    <ds:schemaRef ds:uri="http://schemas.microsoft.com/office/2006/metadata/properties/metaAttributes"/>
-    <ds:schemaRef ds:uri="http://www.w3.org/2001/XMLSchema"/>
-    <ds:schemaRef ds:uri="http://schemas.microsoft.com/office/2006/metadata/properties"/>
-    <ds:schemaRef ds:uri="63c724b1-652e-424f-8d99-4ee509067280"/>
-    <ds:schemaRef ds:uri="2551ef7e-3b29-44d1-a8ad-ef34c26bfc60"/>
-    <ds:schemaRef ds:uri="http://schemas.microsoft.com/office/2006/documentManagement/types"/>
-    <ds:schemaRef ds:uri="http://schemas.microsoft.com/office/infopath/2007/PartnerControls"/>
-    <ds:schemaRef ds:uri="http://schemas.openxmlformats.org/package/2006/metadata/core-properties"/>
-    <ds:schemaRef ds:uri="http://purl.org/dc/elements/1.1/"/>
-    <ds:schemaRef ds:uri="http://purl.org/dc/terms/"/>
-    <ds:schemaRef ds:uri="http://schemas.microsoft.com/internal/obd"/>
+    <ds:schemaRef ds:uri="http://schemas.microsoft.com/office/2006/metadata/longProperties"/>
   </ds:schemaRefs>
 </ds:datastoreItem>
 </file>
</xml_diff>